<commit_message>
construcao dos modelos e relatorio
</commit_message>
<xml_diff>
--- a/report/Nuvemshop_DT_.pptx
+++ b/report/Nuvemshop_DT_.pptx
@@ -5,13 +5,18 @@
     <p:sldMasterId id="2147483648" r:id="rId1"/>
   </p:sldMasterIdLst>
   <p:notesMasterIdLst>
-    <p:notesMasterId r:id="rId6"/>
+    <p:notesMasterId r:id="rId11"/>
   </p:notesMasterIdLst>
   <p:sldIdLst>
     <p:sldId id="256" r:id="rId2"/>
     <p:sldId id="257" r:id="rId3"/>
     <p:sldId id="258" r:id="rId4"/>
-    <p:sldId id="259" r:id="rId5"/>
+    <p:sldId id="260" r:id="rId5"/>
+    <p:sldId id="261" r:id="rId6"/>
+    <p:sldId id="262" r:id="rId7"/>
+    <p:sldId id="263" r:id="rId8"/>
+    <p:sldId id="264" r:id="rId9"/>
+    <p:sldId id="259" r:id="rId10"/>
   </p:sldIdLst>
   <p:sldSz cx="12192000" cy="6858000"/>
   <p:notesSz cx="6858000" cy="9144000"/>
@@ -110,7 +115,107 @@
       </a:defRPr>
     </a:lvl9pPr>
   </p:defaultTextStyle>
+  <p:extLst>
+    <p:ext uri="{EFAFB233-063F-42B5-8137-9DF3F51BA10A}">
+      <p15:sldGuideLst xmlns:p15="http://schemas.microsoft.com/office/powerpoint/2012/main"/>
+    </p:ext>
+  </p:extLst>
 </p:presentation>
+</file>
+
+<file path=ppt/revisionInfo.xml><?xml version="1.0" encoding="utf-8"?>
+<p1510:revInfo xmlns:a="http://schemas.openxmlformats.org/drawingml/2006/main" xmlns:r="http://schemas.openxmlformats.org/officeDocument/2006/relationships" xmlns:p1510="http://schemas.microsoft.com/office/powerpoint/2015/10/main">
+  <p1510:revLst>
+    <p1510:client id="{D8468FA3-B50E-4413-94A0-76E5987FBF04}" v="6" dt="2024-04-15T18:22:15.106"/>
+  </p1510:revLst>
+</p1510:revInfo>
+</file>
+
+<file path=ppt/changesInfos/changesInfo1.xml><?xml version="1.0" encoding="utf-8"?>
+<pc:chgInfo xmlns:a="http://schemas.openxmlformats.org/drawingml/2006/main" xmlns:r="http://schemas.openxmlformats.org/officeDocument/2006/relationships" xmlns:ac="http://schemas.microsoft.com/office/drawing/2013/main/command" xmlns:pc="http://schemas.microsoft.com/office/powerpoint/2013/main/command">
+  <pc:docChgLst>
+    <pc:chgData name="Murilo Mazzotti Silvestrini" userId="568d29bd-3a10-442b-a29c-e93a6530db44" providerId="ADAL" clId="{D8468FA3-B50E-4413-94A0-76E5987FBF04}"/>
+    <pc:docChg chg="undo custSel addSld modSld">
+      <pc:chgData name="Murilo Mazzotti Silvestrini" userId="568d29bd-3a10-442b-a29c-e93a6530db44" providerId="ADAL" clId="{D8468FA3-B50E-4413-94A0-76E5987FBF04}" dt="2024-04-15T18:22:33.283" v="39" actId="20577"/>
+      <pc:docMkLst>
+        <pc:docMk/>
+      </pc:docMkLst>
+      <pc:sldChg chg="modSp mod">
+        <pc:chgData name="Murilo Mazzotti Silvestrini" userId="568d29bd-3a10-442b-a29c-e93a6530db44" providerId="ADAL" clId="{D8468FA3-B50E-4413-94A0-76E5987FBF04}" dt="2024-04-15T18:00:39.117" v="17" actId="20577"/>
+        <pc:sldMkLst>
+          <pc:docMk/>
+          <pc:sldMk cId="574632327" sldId="256"/>
+        </pc:sldMkLst>
+        <pc:spChg chg="mod">
+          <ac:chgData name="Murilo Mazzotti Silvestrini" userId="568d29bd-3a10-442b-a29c-e93a6530db44" providerId="ADAL" clId="{D8468FA3-B50E-4413-94A0-76E5987FBF04}" dt="2024-04-15T18:00:39.117" v="17" actId="20577"/>
+          <ac:spMkLst>
+            <pc:docMk/>
+            <pc:sldMk cId="574632327" sldId="256"/>
+            <ac:spMk id="13" creationId="{70B14712-BB13-9CB2-AE54-B901EEC452AE}"/>
+          </ac:spMkLst>
+        </pc:spChg>
+      </pc:sldChg>
+      <pc:sldChg chg="addSp modSp mod">
+        <pc:chgData name="Murilo Mazzotti Silvestrini" userId="568d29bd-3a10-442b-a29c-e93a6530db44" providerId="ADAL" clId="{D8468FA3-B50E-4413-94A0-76E5987FBF04}" dt="2024-04-15T18:22:33.283" v="39" actId="20577"/>
+        <pc:sldMkLst>
+          <pc:docMk/>
+          <pc:sldMk cId="2611220629" sldId="257"/>
+        </pc:sldMkLst>
+        <pc:spChg chg="add mod">
+          <ac:chgData name="Murilo Mazzotti Silvestrini" userId="568d29bd-3a10-442b-a29c-e93a6530db44" providerId="ADAL" clId="{D8468FA3-B50E-4413-94A0-76E5987FBF04}" dt="2024-04-15T18:22:20.764" v="28" actId="255"/>
+          <ac:spMkLst>
+            <pc:docMk/>
+            <pc:sldMk cId="2611220629" sldId="257"/>
+            <ac:spMk id="6" creationId="{E3777984-FBE1-8E07-9CDB-107E997D3402}"/>
+          </ac:spMkLst>
+        </pc:spChg>
+        <pc:spChg chg="mod">
+          <ac:chgData name="Murilo Mazzotti Silvestrini" userId="568d29bd-3a10-442b-a29c-e93a6530db44" providerId="ADAL" clId="{D8468FA3-B50E-4413-94A0-76E5987FBF04}" dt="2024-04-15T18:22:33.283" v="39" actId="20577"/>
+          <ac:spMkLst>
+            <pc:docMk/>
+            <pc:sldMk cId="2611220629" sldId="257"/>
+            <ac:spMk id="10" creationId="{396D93A1-9263-21FF-88CA-2993CAC8492B}"/>
+          </ac:spMkLst>
+        </pc:spChg>
+      </pc:sldChg>
+      <pc:sldChg chg="add">
+        <pc:chgData name="Murilo Mazzotti Silvestrini" userId="568d29bd-3a10-442b-a29c-e93a6530db44" providerId="ADAL" clId="{D8468FA3-B50E-4413-94A0-76E5987FBF04}" dt="2024-04-15T18:21:49.027" v="18"/>
+        <pc:sldMkLst>
+          <pc:docMk/>
+          <pc:sldMk cId="3370593830" sldId="260"/>
+        </pc:sldMkLst>
+      </pc:sldChg>
+      <pc:sldChg chg="add">
+        <pc:chgData name="Murilo Mazzotti Silvestrini" userId="568d29bd-3a10-442b-a29c-e93a6530db44" providerId="ADAL" clId="{D8468FA3-B50E-4413-94A0-76E5987FBF04}" dt="2024-04-15T18:21:49.266" v="19"/>
+        <pc:sldMkLst>
+          <pc:docMk/>
+          <pc:sldMk cId="1772594908" sldId="261"/>
+        </pc:sldMkLst>
+      </pc:sldChg>
+      <pc:sldChg chg="add">
+        <pc:chgData name="Murilo Mazzotti Silvestrini" userId="568d29bd-3a10-442b-a29c-e93a6530db44" providerId="ADAL" clId="{D8468FA3-B50E-4413-94A0-76E5987FBF04}" dt="2024-04-15T18:21:49.449" v="20"/>
+        <pc:sldMkLst>
+          <pc:docMk/>
+          <pc:sldMk cId="937926876" sldId="262"/>
+        </pc:sldMkLst>
+      </pc:sldChg>
+      <pc:sldChg chg="add">
+        <pc:chgData name="Murilo Mazzotti Silvestrini" userId="568d29bd-3a10-442b-a29c-e93a6530db44" providerId="ADAL" clId="{D8468FA3-B50E-4413-94A0-76E5987FBF04}" dt="2024-04-15T18:21:49.673" v="21"/>
+        <pc:sldMkLst>
+          <pc:docMk/>
+          <pc:sldMk cId="2567184458" sldId="263"/>
+        </pc:sldMkLst>
+      </pc:sldChg>
+      <pc:sldChg chg="add">
+        <pc:chgData name="Murilo Mazzotti Silvestrini" userId="568d29bd-3a10-442b-a29c-e93a6530db44" providerId="ADAL" clId="{D8468FA3-B50E-4413-94A0-76E5987FBF04}" dt="2024-04-15T18:21:50.217" v="22"/>
+        <pc:sldMkLst>
+          <pc:docMk/>
+          <pc:sldMk cId="2176920301" sldId="264"/>
+        </pc:sldMkLst>
+      </pc:sldChg>
+    </pc:docChg>
+  </pc:docChgLst>
+</pc:chgInfo>
 </file>
 
 <file path=ppt/notesMasters/notesMaster1.xml><?xml version="1.0" encoding="utf-8"?>
@@ -195,7 +300,7 @@
           <a:p>
             <a:fld id="{426A487A-1245-46A3-8EA3-6AABF608FF35}" type="datetimeFigureOut">
               <a:rPr lang="pt-BR" smtClean="0"/>
-              <a:t>14/04/2024</a:t>
+              <a:t>15/04/2024</a:t>
             </a:fld>
             <a:endParaRPr lang="pt-BR"/>
           </a:p>
@@ -527,7 +632,7 @@
           <a:p>
             <a:fld id="{737BD92F-85D0-48EC-B51D-BA86E501AC34}" type="slidenum">
               <a:rPr lang="pt-BR" smtClean="0"/>
-              <a:t>4</a:t>
+              <a:t>9</a:t>
             </a:fld>
             <a:endParaRPr lang="pt-BR"/>
           </a:p>
@@ -693,7 +798,7 @@
           <a:p>
             <a:fld id="{DE286571-8A59-43D6-BA85-87348409C590}" type="datetimeFigureOut">
               <a:rPr lang="pt-BR" smtClean="0"/>
-              <a:t>14/04/2024</a:t>
+              <a:t>15/04/2024</a:t>
             </a:fld>
             <a:endParaRPr lang="pt-BR"/>
           </a:p>
@@ -891,7 +996,7 @@
           <a:p>
             <a:fld id="{DE286571-8A59-43D6-BA85-87348409C590}" type="datetimeFigureOut">
               <a:rPr lang="pt-BR" smtClean="0"/>
-              <a:t>14/04/2024</a:t>
+              <a:t>15/04/2024</a:t>
             </a:fld>
             <a:endParaRPr lang="pt-BR"/>
           </a:p>
@@ -1099,7 +1204,7 @@
           <a:p>
             <a:fld id="{DE286571-8A59-43D6-BA85-87348409C590}" type="datetimeFigureOut">
               <a:rPr lang="pt-BR" smtClean="0"/>
-              <a:t>14/04/2024</a:t>
+              <a:t>15/04/2024</a:t>
             </a:fld>
             <a:endParaRPr lang="pt-BR"/>
           </a:p>
@@ -1297,7 +1402,7 @@
           <a:p>
             <a:fld id="{DE286571-8A59-43D6-BA85-87348409C590}" type="datetimeFigureOut">
               <a:rPr lang="pt-BR" smtClean="0"/>
-              <a:t>14/04/2024</a:t>
+              <a:t>15/04/2024</a:t>
             </a:fld>
             <a:endParaRPr lang="pt-BR"/>
           </a:p>
@@ -1572,7 +1677,7 @@
           <a:p>
             <a:fld id="{DE286571-8A59-43D6-BA85-87348409C590}" type="datetimeFigureOut">
               <a:rPr lang="pt-BR" smtClean="0"/>
-              <a:t>14/04/2024</a:t>
+              <a:t>15/04/2024</a:t>
             </a:fld>
             <a:endParaRPr lang="pt-BR"/>
           </a:p>
@@ -1837,7 +1942,7 @@
           <a:p>
             <a:fld id="{DE286571-8A59-43D6-BA85-87348409C590}" type="datetimeFigureOut">
               <a:rPr lang="pt-BR" smtClean="0"/>
-              <a:t>14/04/2024</a:t>
+              <a:t>15/04/2024</a:t>
             </a:fld>
             <a:endParaRPr lang="pt-BR"/>
           </a:p>
@@ -2249,7 +2354,7 @@
           <a:p>
             <a:fld id="{DE286571-8A59-43D6-BA85-87348409C590}" type="datetimeFigureOut">
               <a:rPr lang="pt-BR" smtClean="0"/>
-              <a:t>14/04/2024</a:t>
+              <a:t>15/04/2024</a:t>
             </a:fld>
             <a:endParaRPr lang="pt-BR"/>
           </a:p>
@@ -2390,7 +2495,7 @@
           <a:p>
             <a:fld id="{DE286571-8A59-43D6-BA85-87348409C590}" type="datetimeFigureOut">
               <a:rPr lang="pt-BR" smtClean="0"/>
-              <a:t>14/04/2024</a:t>
+              <a:t>15/04/2024</a:t>
             </a:fld>
             <a:endParaRPr lang="pt-BR"/>
           </a:p>
@@ -2503,7 +2608,7 @@
           <a:p>
             <a:fld id="{DE286571-8A59-43D6-BA85-87348409C590}" type="datetimeFigureOut">
               <a:rPr lang="pt-BR" smtClean="0"/>
-              <a:t>14/04/2024</a:t>
+              <a:t>15/04/2024</a:t>
             </a:fld>
             <a:endParaRPr lang="pt-BR"/>
           </a:p>
@@ -2814,7 +2919,7 @@
           <a:p>
             <a:fld id="{DE286571-8A59-43D6-BA85-87348409C590}" type="datetimeFigureOut">
               <a:rPr lang="pt-BR" smtClean="0"/>
-              <a:t>14/04/2024</a:t>
+              <a:t>15/04/2024</a:t>
             </a:fld>
             <a:endParaRPr lang="pt-BR"/>
           </a:p>
@@ -3102,7 +3207,7 @@
           <a:p>
             <a:fld id="{DE286571-8A59-43D6-BA85-87348409C590}" type="datetimeFigureOut">
               <a:rPr lang="pt-BR" smtClean="0"/>
-              <a:t>14/04/2024</a:t>
+              <a:t>15/04/2024</a:t>
             </a:fld>
             <a:endParaRPr lang="pt-BR"/>
           </a:p>
@@ -3343,7 +3448,7 @@
           <a:p>
             <a:fld id="{DE286571-8A59-43D6-BA85-87348409C590}" type="datetimeFigureOut">
               <a:rPr lang="pt-BR" smtClean="0"/>
-              <a:t>14/04/2024</a:t>
+              <a:t>15/04/2024</a:t>
             </a:fld>
             <a:endParaRPr lang="pt-BR"/>
           </a:p>
@@ -3934,29 +4039,7 @@
                 <a:ea typeface="Source Sans Pro" panose="020B0503030403020204" pitchFamily="34" charset="0"/>
                 <a:cs typeface="Arial" panose="020B0604020202020204" pitchFamily="34" charset="0"/>
               </a:rPr>
-              <a:t>Murilo </a:t>
-            </a:r>
-            <a:r>
-              <a:rPr lang="pt-BR" sz="2000" dirty="0" err="1">
-                <a:solidFill>
-                  <a:srgbClr val="2D3356"/>
-                </a:solidFill>
-                <a:latin typeface="Arial" panose="020B0604020202020204" pitchFamily="34" charset="0"/>
-                <a:ea typeface="Source Sans Pro" panose="020B0503030403020204" pitchFamily="34" charset="0"/>
-                <a:cs typeface="Arial" panose="020B0604020202020204" pitchFamily="34" charset="0"/>
-              </a:rPr>
-              <a:t>Mazzotti</a:t>
-            </a:r>
-            <a:r>
-              <a:rPr lang="pt-BR" sz="2000" dirty="0">
-                <a:solidFill>
-                  <a:srgbClr val="2D3356"/>
-                </a:solidFill>
-                <a:latin typeface="Arial" panose="020B0604020202020204" pitchFamily="34" charset="0"/>
-                <a:ea typeface="Source Sans Pro" panose="020B0503030403020204" pitchFamily="34" charset="0"/>
-                <a:cs typeface="Arial" panose="020B0604020202020204" pitchFamily="34" charset="0"/>
-              </a:rPr>
-              <a:t> Silvestrini</a:t>
+              <a:t>Murilo Mazzotti Silvestrini</a:t>
             </a:r>
           </a:p>
         </p:txBody>
@@ -4300,8 +4383,8 @@
         </p:nvSpPr>
         <p:spPr>
           <a:xfrm>
-            <a:off x="515255" y="436211"/>
-            <a:ext cx="6096000" cy="369332"/>
+            <a:off x="515255" y="282323"/>
+            <a:ext cx="6096000" cy="523220"/>
           </a:xfrm>
           <a:prstGeom prst="rect">
             <a:avLst/>
@@ -4315,7 +4398,49 @@
           <a:lstStyle/>
           <a:p>
             <a:r>
-              <a:rPr lang="pt-BR" b="1" dirty="0">
+              <a:rPr lang="pt-BR" sz="2800" b="1" dirty="0">
+                <a:solidFill>
+                  <a:srgbClr val="2D3356"/>
+                </a:solidFill>
+                <a:latin typeface="Arial" panose="020B0604020202020204" pitchFamily="34" charset="0"/>
+                <a:ea typeface="Source Sans Pro" panose="020B0503030403020204" pitchFamily="34" charset="0"/>
+                <a:cs typeface="Arial" panose="020B0604020202020204" pitchFamily="34" charset="0"/>
+              </a:rPr>
+              <a:t>Objetivos</a:t>
+            </a:r>
+          </a:p>
+        </p:txBody>
+      </p:sp>
+      <p:sp>
+        <p:nvSpPr>
+          <p:cNvPr id="6" name="CaixaDeTexto 5">
+            <a:extLst>
+              <a:ext uri="{FF2B5EF4-FFF2-40B4-BE49-F238E27FC236}">
+                <a16:creationId xmlns:a16="http://schemas.microsoft.com/office/drawing/2014/main" id="{E3777984-FBE1-8E07-9CDB-107E997D3402}"/>
+              </a:ext>
+            </a:extLst>
+          </p:cNvPr>
+          <p:cNvSpPr txBox="1"/>
+          <p:nvPr/>
+        </p:nvSpPr>
+        <p:spPr>
+          <a:xfrm>
+            <a:off x="736928" y="1291287"/>
+            <a:ext cx="6096000" cy="369332"/>
+          </a:xfrm>
+          <a:prstGeom prst="rect">
+            <a:avLst/>
+          </a:prstGeom>
+          <a:noFill/>
+        </p:spPr>
+        <p:txBody>
+          <a:bodyPr wrap="square" rtlCol="0">
+            <a:spAutoFit/>
+          </a:bodyPr>
+          <a:lstStyle/>
+          <a:p>
+            <a:r>
+              <a:rPr lang="pt-BR" dirty="0">
                 <a:solidFill>
                   <a:srgbClr val="2D3356"/>
                 </a:solidFill>
@@ -4326,7 +4451,7 @@
               <a:t>Previsão de </a:t>
             </a:r>
             <a:r>
-              <a:rPr lang="pt-BR" b="1" dirty="0" err="1">
+              <a:rPr lang="pt-BR" dirty="0" err="1">
                 <a:solidFill>
                   <a:srgbClr val="2D3356"/>
                 </a:solidFill>
@@ -4337,7 +4462,7 @@
               <a:t>Quality</a:t>
             </a:r>
             <a:r>
-              <a:rPr lang="pt-BR" b="1" dirty="0">
+              <a:rPr lang="pt-BR" dirty="0">
                 <a:solidFill>
                   <a:srgbClr val="2D3356"/>
                 </a:solidFill>
@@ -4753,6 +4878,1951 @@
 </file>
 
 <file path=ppt/slides/slide4.xml><?xml version="1.0" encoding="utf-8"?>
+<p:sld xmlns:a="http://schemas.openxmlformats.org/drawingml/2006/main" xmlns:r="http://schemas.openxmlformats.org/officeDocument/2006/relationships" xmlns:p="http://schemas.openxmlformats.org/presentationml/2006/main">
+  <p:cSld>
+    <p:spTree>
+      <p:nvGrpSpPr>
+        <p:cNvPr id="1" name=""/>
+        <p:cNvGrpSpPr/>
+        <p:nvPr/>
+      </p:nvGrpSpPr>
+      <p:grpSpPr>
+        <a:xfrm>
+          <a:off x="0" y="0"/>
+          <a:ext cx="0" cy="0"/>
+          <a:chOff x="0" y="0"/>
+          <a:chExt cx="0" cy="0"/>
+        </a:xfrm>
+      </p:grpSpPr>
+      <p:pic>
+        <p:nvPicPr>
+          <p:cNvPr id="9" name="Imagem 8">
+            <a:extLst>
+              <a:ext uri="{FF2B5EF4-FFF2-40B4-BE49-F238E27FC236}">
+                <a16:creationId xmlns:a16="http://schemas.microsoft.com/office/drawing/2014/main" id="{B2636F1D-1518-9BCD-6356-3D86F93A3CD0}"/>
+              </a:ext>
+            </a:extLst>
+          </p:cNvPr>
+          <p:cNvPicPr>
+            <a:picLocks noChangeAspect="1"/>
+          </p:cNvPicPr>
+          <p:nvPr/>
+        </p:nvPicPr>
+        <p:blipFill rotWithShape="1">
+          <a:blip r:embed="rId2">
+            <a:extLst>
+              <a:ext uri="{28A0092B-C50C-407E-A947-70E740481C1C}">
+                <a14:useLocalDpi xmlns:a14="http://schemas.microsoft.com/office/drawing/2010/main" val="0"/>
+              </a:ext>
+            </a:extLst>
+          </a:blip>
+          <a:srcRect l="31460" t="15835" r="31841" b="15594"/>
+          <a:stretch/>
+        </p:blipFill>
+        <p:spPr>
+          <a:xfrm>
+            <a:off x="11121272" y="5791200"/>
+            <a:ext cx="969130" cy="950686"/>
+          </a:xfrm>
+          <a:prstGeom prst="rect">
+            <a:avLst/>
+          </a:prstGeom>
+        </p:spPr>
+      </p:pic>
+      <p:sp>
+        <p:nvSpPr>
+          <p:cNvPr id="2" name="Retângulo 1">
+            <a:extLst>
+              <a:ext uri="{FF2B5EF4-FFF2-40B4-BE49-F238E27FC236}">
+                <a16:creationId xmlns:a16="http://schemas.microsoft.com/office/drawing/2014/main" id="{ACFCFF69-0145-1DB8-07A7-1430ECA53561}"/>
+              </a:ext>
+            </a:extLst>
+          </p:cNvPr>
+          <p:cNvSpPr/>
+          <p:nvPr/>
+        </p:nvSpPr>
+        <p:spPr>
+          <a:xfrm>
+            <a:off x="101598" y="3947886"/>
+            <a:ext cx="159657" cy="2750457"/>
+          </a:xfrm>
+          <a:prstGeom prst="rect">
+            <a:avLst/>
+          </a:prstGeom>
+          <a:solidFill>
+            <a:srgbClr val="2C3357"/>
+          </a:solidFill>
+          <a:ln>
+            <a:noFill/>
+          </a:ln>
+        </p:spPr>
+        <p:style>
+          <a:lnRef idx="2">
+            <a:schemeClr val="accent1">
+              <a:shade val="15000"/>
+            </a:schemeClr>
+          </a:lnRef>
+          <a:fillRef idx="1">
+            <a:schemeClr val="accent1"/>
+          </a:fillRef>
+          <a:effectRef idx="0">
+            <a:schemeClr val="accent1"/>
+          </a:effectRef>
+          <a:fontRef idx="minor">
+            <a:schemeClr val="lt1"/>
+          </a:fontRef>
+        </p:style>
+        <p:txBody>
+          <a:bodyPr rtlCol="0" anchor="ctr"/>
+          <a:lstStyle/>
+          <a:p>
+            <a:pPr algn="ctr"/>
+            <a:endParaRPr lang="pt-BR"/>
+          </a:p>
+        </p:txBody>
+      </p:sp>
+      <p:sp>
+        <p:nvSpPr>
+          <p:cNvPr id="3" name="Retângulo 2">
+            <a:extLst>
+              <a:ext uri="{FF2B5EF4-FFF2-40B4-BE49-F238E27FC236}">
+                <a16:creationId xmlns:a16="http://schemas.microsoft.com/office/drawing/2014/main" id="{7CAC28F4-82CB-DCD1-BECB-10D07127B697}"/>
+              </a:ext>
+            </a:extLst>
+          </p:cNvPr>
+          <p:cNvSpPr/>
+          <p:nvPr/>
+        </p:nvSpPr>
+        <p:spPr>
+          <a:xfrm>
+            <a:off x="355598" y="6008914"/>
+            <a:ext cx="159657" cy="689429"/>
+          </a:xfrm>
+          <a:prstGeom prst="rect">
+            <a:avLst/>
+          </a:prstGeom>
+          <a:solidFill>
+            <a:srgbClr val="2C3357"/>
+          </a:solidFill>
+          <a:ln>
+            <a:noFill/>
+          </a:ln>
+        </p:spPr>
+        <p:style>
+          <a:lnRef idx="2">
+            <a:schemeClr val="accent1">
+              <a:shade val="15000"/>
+            </a:schemeClr>
+          </a:lnRef>
+          <a:fillRef idx="1">
+            <a:schemeClr val="accent1"/>
+          </a:fillRef>
+          <a:effectRef idx="0">
+            <a:schemeClr val="accent1"/>
+          </a:effectRef>
+          <a:fontRef idx="minor">
+            <a:schemeClr val="lt1"/>
+          </a:fontRef>
+        </p:style>
+        <p:txBody>
+          <a:bodyPr rtlCol="0" anchor="ctr"/>
+          <a:lstStyle/>
+          <a:p>
+            <a:pPr algn="ctr"/>
+            <a:endParaRPr lang="pt-BR"/>
+          </a:p>
+        </p:txBody>
+      </p:sp>
+      <p:sp>
+        <p:nvSpPr>
+          <p:cNvPr id="4" name="Retângulo 3">
+            <a:extLst>
+              <a:ext uri="{FF2B5EF4-FFF2-40B4-BE49-F238E27FC236}">
+                <a16:creationId xmlns:a16="http://schemas.microsoft.com/office/drawing/2014/main" id="{89AD25BB-9EF0-67F9-4D60-8D9F4E15B37A}"/>
+              </a:ext>
+            </a:extLst>
+          </p:cNvPr>
+          <p:cNvSpPr/>
+          <p:nvPr/>
+        </p:nvSpPr>
+        <p:spPr>
+          <a:xfrm>
+            <a:off x="11887200" y="116114"/>
+            <a:ext cx="159657" cy="2750457"/>
+          </a:xfrm>
+          <a:prstGeom prst="rect">
+            <a:avLst/>
+          </a:prstGeom>
+          <a:solidFill>
+            <a:srgbClr val="2C3357"/>
+          </a:solidFill>
+          <a:ln>
+            <a:noFill/>
+          </a:ln>
+        </p:spPr>
+        <p:style>
+          <a:lnRef idx="2">
+            <a:schemeClr val="accent1">
+              <a:shade val="15000"/>
+            </a:schemeClr>
+          </a:lnRef>
+          <a:fillRef idx="1">
+            <a:schemeClr val="accent1"/>
+          </a:fillRef>
+          <a:effectRef idx="0">
+            <a:schemeClr val="accent1"/>
+          </a:effectRef>
+          <a:fontRef idx="minor">
+            <a:schemeClr val="lt1"/>
+          </a:fontRef>
+        </p:style>
+        <p:txBody>
+          <a:bodyPr rtlCol="0" anchor="ctr"/>
+          <a:lstStyle/>
+          <a:p>
+            <a:pPr algn="ctr"/>
+            <a:endParaRPr lang="pt-BR"/>
+          </a:p>
+        </p:txBody>
+      </p:sp>
+      <p:sp>
+        <p:nvSpPr>
+          <p:cNvPr id="5" name="Retângulo 4">
+            <a:extLst>
+              <a:ext uri="{FF2B5EF4-FFF2-40B4-BE49-F238E27FC236}">
+                <a16:creationId xmlns:a16="http://schemas.microsoft.com/office/drawing/2014/main" id="{D7A0BD04-7488-0F80-C86B-76FD8D02D634}"/>
+              </a:ext>
+            </a:extLst>
+          </p:cNvPr>
+          <p:cNvSpPr/>
+          <p:nvPr/>
+        </p:nvSpPr>
+        <p:spPr>
+          <a:xfrm>
+            <a:off x="11605837" y="116114"/>
+            <a:ext cx="159657" cy="689429"/>
+          </a:xfrm>
+          <a:prstGeom prst="rect">
+            <a:avLst/>
+          </a:prstGeom>
+          <a:solidFill>
+            <a:srgbClr val="2C3357"/>
+          </a:solidFill>
+          <a:ln>
+            <a:noFill/>
+          </a:ln>
+        </p:spPr>
+        <p:style>
+          <a:lnRef idx="2">
+            <a:schemeClr val="accent1">
+              <a:shade val="15000"/>
+            </a:schemeClr>
+          </a:lnRef>
+          <a:fillRef idx="1">
+            <a:schemeClr val="accent1"/>
+          </a:fillRef>
+          <a:effectRef idx="0">
+            <a:schemeClr val="accent1"/>
+          </a:effectRef>
+          <a:fontRef idx="minor">
+            <a:schemeClr val="lt1"/>
+          </a:fontRef>
+        </p:style>
+        <p:txBody>
+          <a:bodyPr rtlCol="0" anchor="ctr"/>
+          <a:lstStyle/>
+          <a:p>
+            <a:pPr algn="ctr"/>
+            <a:endParaRPr lang="pt-BR"/>
+          </a:p>
+        </p:txBody>
+      </p:sp>
+      <p:sp>
+        <p:nvSpPr>
+          <p:cNvPr id="8" name="Retângulo: Cantos Arredondados 7">
+            <a:extLst>
+              <a:ext uri="{FF2B5EF4-FFF2-40B4-BE49-F238E27FC236}">
+                <a16:creationId xmlns:a16="http://schemas.microsoft.com/office/drawing/2014/main" id="{FEDA4279-046B-CFEB-8276-204885BC3435}"/>
+              </a:ext>
+            </a:extLst>
+          </p:cNvPr>
+          <p:cNvSpPr/>
+          <p:nvPr/>
+        </p:nvSpPr>
+        <p:spPr>
+          <a:xfrm>
+            <a:off x="515255" y="805543"/>
+            <a:ext cx="5892800" cy="77652"/>
+          </a:xfrm>
+          <a:prstGeom prst="roundRect">
+            <a:avLst/>
+          </a:prstGeom>
+          <a:solidFill>
+            <a:srgbClr val="2C3357"/>
+          </a:solidFill>
+          <a:ln>
+            <a:noFill/>
+          </a:ln>
+        </p:spPr>
+        <p:style>
+          <a:lnRef idx="2">
+            <a:schemeClr val="accent1">
+              <a:shade val="15000"/>
+            </a:schemeClr>
+          </a:lnRef>
+          <a:fillRef idx="1">
+            <a:schemeClr val="accent1"/>
+          </a:fillRef>
+          <a:effectRef idx="0">
+            <a:schemeClr val="accent1"/>
+          </a:effectRef>
+          <a:fontRef idx="minor">
+            <a:schemeClr val="lt1"/>
+          </a:fontRef>
+        </p:style>
+        <p:txBody>
+          <a:bodyPr rtlCol="0" anchor="ctr"/>
+          <a:lstStyle/>
+          <a:p>
+            <a:pPr algn="ctr"/>
+            <a:endParaRPr lang="pt-BR"/>
+          </a:p>
+        </p:txBody>
+      </p:sp>
+      <p:sp>
+        <p:nvSpPr>
+          <p:cNvPr id="10" name="CaixaDeTexto 9">
+            <a:extLst>
+              <a:ext uri="{FF2B5EF4-FFF2-40B4-BE49-F238E27FC236}">
+                <a16:creationId xmlns:a16="http://schemas.microsoft.com/office/drawing/2014/main" id="{396D93A1-9263-21FF-88CA-2993CAC8492B}"/>
+              </a:ext>
+            </a:extLst>
+          </p:cNvPr>
+          <p:cNvSpPr txBox="1"/>
+          <p:nvPr/>
+        </p:nvSpPr>
+        <p:spPr>
+          <a:xfrm>
+            <a:off x="515255" y="436211"/>
+            <a:ext cx="6096000" cy="369332"/>
+          </a:xfrm>
+          <a:prstGeom prst="rect">
+            <a:avLst/>
+          </a:prstGeom>
+          <a:noFill/>
+        </p:spPr>
+        <p:txBody>
+          <a:bodyPr wrap="square" rtlCol="0">
+            <a:spAutoFit/>
+          </a:bodyPr>
+          <a:lstStyle/>
+          <a:p>
+            <a:r>
+              <a:rPr lang="pt-BR" b="1" dirty="0">
+                <a:solidFill>
+                  <a:srgbClr val="2D3356"/>
+                </a:solidFill>
+                <a:latin typeface="Arial" panose="020B0604020202020204" pitchFamily="34" charset="0"/>
+                <a:ea typeface="Source Sans Pro" panose="020B0503030403020204" pitchFamily="34" charset="0"/>
+                <a:cs typeface="Arial" panose="020B0604020202020204" pitchFamily="34" charset="0"/>
+              </a:rPr>
+              <a:t>Previsão de </a:t>
+            </a:r>
+            <a:r>
+              <a:rPr lang="pt-BR" b="1" dirty="0" err="1">
+                <a:solidFill>
+                  <a:srgbClr val="2D3356"/>
+                </a:solidFill>
+                <a:latin typeface="Arial" panose="020B0604020202020204" pitchFamily="34" charset="0"/>
+                <a:ea typeface="Source Sans Pro" panose="020B0503030403020204" pitchFamily="34" charset="0"/>
+                <a:cs typeface="Arial" panose="020B0604020202020204" pitchFamily="34" charset="0"/>
+              </a:rPr>
+              <a:t>Quality</a:t>
+            </a:r>
+            <a:r>
+              <a:rPr lang="pt-BR" b="1" dirty="0">
+                <a:solidFill>
+                  <a:srgbClr val="2D3356"/>
+                </a:solidFill>
+                <a:latin typeface="Arial" panose="020B0604020202020204" pitchFamily="34" charset="0"/>
+                <a:ea typeface="Source Sans Pro" panose="020B0503030403020204" pitchFamily="34" charset="0"/>
+                <a:cs typeface="Arial" panose="020B0604020202020204" pitchFamily="34" charset="0"/>
+              </a:rPr>
+              <a:t> Leads (QL)</a:t>
+            </a:r>
+          </a:p>
+        </p:txBody>
+      </p:sp>
+    </p:spTree>
+    <p:extLst>
+      <p:ext uri="{BB962C8B-B14F-4D97-AF65-F5344CB8AC3E}">
+        <p14:creationId xmlns:p14="http://schemas.microsoft.com/office/powerpoint/2010/main" val="3370593830"/>
+      </p:ext>
+    </p:extLst>
+  </p:cSld>
+  <p:clrMapOvr>
+    <a:masterClrMapping/>
+  </p:clrMapOvr>
+</p:sld>
+</file>
+
+<file path=ppt/slides/slide5.xml><?xml version="1.0" encoding="utf-8"?>
+<p:sld xmlns:a="http://schemas.openxmlformats.org/drawingml/2006/main" xmlns:r="http://schemas.openxmlformats.org/officeDocument/2006/relationships" xmlns:p="http://schemas.openxmlformats.org/presentationml/2006/main">
+  <p:cSld>
+    <p:spTree>
+      <p:nvGrpSpPr>
+        <p:cNvPr id="1" name=""/>
+        <p:cNvGrpSpPr/>
+        <p:nvPr/>
+      </p:nvGrpSpPr>
+      <p:grpSpPr>
+        <a:xfrm>
+          <a:off x="0" y="0"/>
+          <a:ext cx="0" cy="0"/>
+          <a:chOff x="0" y="0"/>
+          <a:chExt cx="0" cy="0"/>
+        </a:xfrm>
+      </p:grpSpPr>
+      <p:pic>
+        <p:nvPicPr>
+          <p:cNvPr id="9" name="Imagem 8">
+            <a:extLst>
+              <a:ext uri="{FF2B5EF4-FFF2-40B4-BE49-F238E27FC236}">
+                <a16:creationId xmlns:a16="http://schemas.microsoft.com/office/drawing/2014/main" id="{B2636F1D-1518-9BCD-6356-3D86F93A3CD0}"/>
+              </a:ext>
+            </a:extLst>
+          </p:cNvPr>
+          <p:cNvPicPr>
+            <a:picLocks noChangeAspect="1"/>
+          </p:cNvPicPr>
+          <p:nvPr/>
+        </p:nvPicPr>
+        <p:blipFill rotWithShape="1">
+          <a:blip r:embed="rId2">
+            <a:extLst>
+              <a:ext uri="{28A0092B-C50C-407E-A947-70E740481C1C}">
+                <a14:useLocalDpi xmlns:a14="http://schemas.microsoft.com/office/drawing/2010/main" val="0"/>
+              </a:ext>
+            </a:extLst>
+          </a:blip>
+          <a:srcRect l="31460" t="15835" r="31841" b="15594"/>
+          <a:stretch/>
+        </p:blipFill>
+        <p:spPr>
+          <a:xfrm>
+            <a:off x="11121272" y="5791200"/>
+            <a:ext cx="969130" cy="950686"/>
+          </a:xfrm>
+          <a:prstGeom prst="rect">
+            <a:avLst/>
+          </a:prstGeom>
+        </p:spPr>
+      </p:pic>
+      <p:sp>
+        <p:nvSpPr>
+          <p:cNvPr id="2" name="Retângulo 1">
+            <a:extLst>
+              <a:ext uri="{FF2B5EF4-FFF2-40B4-BE49-F238E27FC236}">
+                <a16:creationId xmlns:a16="http://schemas.microsoft.com/office/drawing/2014/main" id="{ACFCFF69-0145-1DB8-07A7-1430ECA53561}"/>
+              </a:ext>
+            </a:extLst>
+          </p:cNvPr>
+          <p:cNvSpPr/>
+          <p:nvPr/>
+        </p:nvSpPr>
+        <p:spPr>
+          <a:xfrm>
+            <a:off x="101598" y="3947886"/>
+            <a:ext cx="159657" cy="2750457"/>
+          </a:xfrm>
+          <a:prstGeom prst="rect">
+            <a:avLst/>
+          </a:prstGeom>
+          <a:solidFill>
+            <a:srgbClr val="2C3357"/>
+          </a:solidFill>
+          <a:ln>
+            <a:noFill/>
+          </a:ln>
+        </p:spPr>
+        <p:style>
+          <a:lnRef idx="2">
+            <a:schemeClr val="accent1">
+              <a:shade val="15000"/>
+            </a:schemeClr>
+          </a:lnRef>
+          <a:fillRef idx="1">
+            <a:schemeClr val="accent1"/>
+          </a:fillRef>
+          <a:effectRef idx="0">
+            <a:schemeClr val="accent1"/>
+          </a:effectRef>
+          <a:fontRef idx="minor">
+            <a:schemeClr val="lt1"/>
+          </a:fontRef>
+        </p:style>
+        <p:txBody>
+          <a:bodyPr rtlCol="0" anchor="ctr"/>
+          <a:lstStyle/>
+          <a:p>
+            <a:pPr algn="ctr"/>
+            <a:endParaRPr lang="pt-BR"/>
+          </a:p>
+        </p:txBody>
+      </p:sp>
+      <p:sp>
+        <p:nvSpPr>
+          <p:cNvPr id="3" name="Retângulo 2">
+            <a:extLst>
+              <a:ext uri="{FF2B5EF4-FFF2-40B4-BE49-F238E27FC236}">
+                <a16:creationId xmlns:a16="http://schemas.microsoft.com/office/drawing/2014/main" id="{7CAC28F4-82CB-DCD1-BECB-10D07127B697}"/>
+              </a:ext>
+            </a:extLst>
+          </p:cNvPr>
+          <p:cNvSpPr/>
+          <p:nvPr/>
+        </p:nvSpPr>
+        <p:spPr>
+          <a:xfrm>
+            <a:off x="355598" y="6008914"/>
+            <a:ext cx="159657" cy="689429"/>
+          </a:xfrm>
+          <a:prstGeom prst="rect">
+            <a:avLst/>
+          </a:prstGeom>
+          <a:solidFill>
+            <a:srgbClr val="2C3357"/>
+          </a:solidFill>
+          <a:ln>
+            <a:noFill/>
+          </a:ln>
+        </p:spPr>
+        <p:style>
+          <a:lnRef idx="2">
+            <a:schemeClr val="accent1">
+              <a:shade val="15000"/>
+            </a:schemeClr>
+          </a:lnRef>
+          <a:fillRef idx="1">
+            <a:schemeClr val="accent1"/>
+          </a:fillRef>
+          <a:effectRef idx="0">
+            <a:schemeClr val="accent1"/>
+          </a:effectRef>
+          <a:fontRef idx="minor">
+            <a:schemeClr val="lt1"/>
+          </a:fontRef>
+        </p:style>
+        <p:txBody>
+          <a:bodyPr rtlCol="0" anchor="ctr"/>
+          <a:lstStyle/>
+          <a:p>
+            <a:pPr algn="ctr"/>
+            <a:endParaRPr lang="pt-BR"/>
+          </a:p>
+        </p:txBody>
+      </p:sp>
+      <p:sp>
+        <p:nvSpPr>
+          <p:cNvPr id="4" name="Retângulo 3">
+            <a:extLst>
+              <a:ext uri="{FF2B5EF4-FFF2-40B4-BE49-F238E27FC236}">
+                <a16:creationId xmlns:a16="http://schemas.microsoft.com/office/drawing/2014/main" id="{89AD25BB-9EF0-67F9-4D60-8D9F4E15B37A}"/>
+              </a:ext>
+            </a:extLst>
+          </p:cNvPr>
+          <p:cNvSpPr/>
+          <p:nvPr/>
+        </p:nvSpPr>
+        <p:spPr>
+          <a:xfrm>
+            <a:off x="11887200" y="116114"/>
+            <a:ext cx="159657" cy="2750457"/>
+          </a:xfrm>
+          <a:prstGeom prst="rect">
+            <a:avLst/>
+          </a:prstGeom>
+          <a:solidFill>
+            <a:srgbClr val="2C3357"/>
+          </a:solidFill>
+          <a:ln>
+            <a:noFill/>
+          </a:ln>
+        </p:spPr>
+        <p:style>
+          <a:lnRef idx="2">
+            <a:schemeClr val="accent1">
+              <a:shade val="15000"/>
+            </a:schemeClr>
+          </a:lnRef>
+          <a:fillRef idx="1">
+            <a:schemeClr val="accent1"/>
+          </a:fillRef>
+          <a:effectRef idx="0">
+            <a:schemeClr val="accent1"/>
+          </a:effectRef>
+          <a:fontRef idx="minor">
+            <a:schemeClr val="lt1"/>
+          </a:fontRef>
+        </p:style>
+        <p:txBody>
+          <a:bodyPr rtlCol="0" anchor="ctr"/>
+          <a:lstStyle/>
+          <a:p>
+            <a:pPr algn="ctr"/>
+            <a:endParaRPr lang="pt-BR"/>
+          </a:p>
+        </p:txBody>
+      </p:sp>
+      <p:sp>
+        <p:nvSpPr>
+          <p:cNvPr id="5" name="Retângulo 4">
+            <a:extLst>
+              <a:ext uri="{FF2B5EF4-FFF2-40B4-BE49-F238E27FC236}">
+                <a16:creationId xmlns:a16="http://schemas.microsoft.com/office/drawing/2014/main" id="{D7A0BD04-7488-0F80-C86B-76FD8D02D634}"/>
+              </a:ext>
+            </a:extLst>
+          </p:cNvPr>
+          <p:cNvSpPr/>
+          <p:nvPr/>
+        </p:nvSpPr>
+        <p:spPr>
+          <a:xfrm>
+            <a:off x="11605837" y="116114"/>
+            <a:ext cx="159657" cy="689429"/>
+          </a:xfrm>
+          <a:prstGeom prst="rect">
+            <a:avLst/>
+          </a:prstGeom>
+          <a:solidFill>
+            <a:srgbClr val="2C3357"/>
+          </a:solidFill>
+          <a:ln>
+            <a:noFill/>
+          </a:ln>
+        </p:spPr>
+        <p:style>
+          <a:lnRef idx="2">
+            <a:schemeClr val="accent1">
+              <a:shade val="15000"/>
+            </a:schemeClr>
+          </a:lnRef>
+          <a:fillRef idx="1">
+            <a:schemeClr val="accent1"/>
+          </a:fillRef>
+          <a:effectRef idx="0">
+            <a:schemeClr val="accent1"/>
+          </a:effectRef>
+          <a:fontRef idx="minor">
+            <a:schemeClr val="lt1"/>
+          </a:fontRef>
+        </p:style>
+        <p:txBody>
+          <a:bodyPr rtlCol="0" anchor="ctr"/>
+          <a:lstStyle/>
+          <a:p>
+            <a:pPr algn="ctr"/>
+            <a:endParaRPr lang="pt-BR"/>
+          </a:p>
+        </p:txBody>
+      </p:sp>
+      <p:sp>
+        <p:nvSpPr>
+          <p:cNvPr id="8" name="Retângulo: Cantos Arredondados 7">
+            <a:extLst>
+              <a:ext uri="{FF2B5EF4-FFF2-40B4-BE49-F238E27FC236}">
+                <a16:creationId xmlns:a16="http://schemas.microsoft.com/office/drawing/2014/main" id="{FEDA4279-046B-CFEB-8276-204885BC3435}"/>
+              </a:ext>
+            </a:extLst>
+          </p:cNvPr>
+          <p:cNvSpPr/>
+          <p:nvPr/>
+        </p:nvSpPr>
+        <p:spPr>
+          <a:xfrm>
+            <a:off x="515255" y="805543"/>
+            <a:ext cx="5892800" cy="77652"/>
+          </a:xfrm>
+          <a:prstGeom prst="roundRect">
+            <a:avLst/>
+          </a:prstGeom>
+          <a:solidFill>
+            <a:srgbClr val="2C3357"/>
+          </a:solidFill>
+          <a:ln>
+            <a:noFill/>
+          </a:ln>
+        </p:spPr>
+        <p:style>
+          <a:lnRef idx="2">
+            <a:schemeClr val="accent1">
+              <a:shade val="15000"/>
+            </a:schemeClr>
+          </a:lnRef>
+          <a:fillRef idx="1">
+            <a:schemeClr val="accent1"/>
+          </a:fillRef>
+          <a:effectRef idx="0">
+            <a:schemeClr val="accent1"/>
+          </a:effectRef>
+          <a:fontRef idx="minor">
+            <a:schemeClr val="lt1"/>
+          </a:fontRef>
+        </p:style>
+        <p:txBody>
+          <a:bodyPr rtlCol="0" anchor="ctr"/>
+          <a:lstStyle/>
+          <a:p>
+            <a:pPr algn="ctr"/>
+            <a:endParaRPr lang="pt-BR"/>
+          </a:p>
+        </p:txBody>
+      </p:sp>
+      <p:sp>
+        <p:nvSpPr>
+          <p:cNvPr id="10" name="CaixaDeTexto 9">
+            <a:extLst>
+              <a:ext uri="{FF2B5EF4-FFF2-40B4-BE49-F238E27FC236}">
+                <a16:creationId xmlns:a16="http://schemas.microsoft.com/office/drawing/2014/main" id="{396D93A1-9263-21FF-88CA-2993CAC8492B}"/>
+              </a:ext>
+            </a:extLst>
+          </p:cNvPr>
+          <p:cNvSpPr txBox="1"/>
+          <p:nvPr/>
+        </p:nvSpPr>
+        <p:spPr>
+          <a:xfrm>
+            <a:off x="515255" y="436211"/>
+            <a:ext cx="6096000" cy="369332"/>
+          </a:xfrm>
+          <a:prstGeom prst="rect">
+            <a:avLst/>
+          </a:prstGeom>
+          <a:noFill/>
+        </p:spPr>
+        <p:txBody>
+          <a:bodyPr wrap="square" rtlCol="0">
+            <a:spAutoFit/>
+          </a:bodyPr>
+          <a:lstStyle/>
+          <a:p>
+            <a:r>
+              <a:rPr lang="pt-BR" b="1" dirty="0">
+                <a:solidFill>
+                  <a:srgbClr val="2D3356"/>
+                </a:solidFill>
+                <a:latin typeface="Arial" panose="020B0604020202020204" pitchFamily="34" charset="0"/>
+                <a:ea typeface="Source Sans Pro" panose="020B0503030403020204" pitchFamily="34" charset="0"/>
+                <a:cs typeface="Arial" panose="020B0604020202020204" pitchFamily="34" charset="0"/>
+              </a:rPr>
+              <a:t>Previsão de </a:t>
+            </a:r>
+            <a:r>
+              <a:rPr lang="pt-BR" b="1" dirty="0" err="1">
+                <a:solidFill>
+                  <a:srgbClr val="2D3356"/>
+                </a:solidFill>
+                <a:latin typeface="Arial" panose="020B0604020202020204" pitchFamily="34" charset="0"/>
+                <a:ea typeface="Source Sans Pro" panose="020B0503030403020204" pitchFamily="34" charset="0"/>
+                <a:cs typeface="Arial" panose="020B0604020202020204" pitchFamily="34" charset="0"/>
+              </a:rPr>
+              <a:t>Quality</a:t>
+            </a:r>
+            <a:r>
+              <a:rPr lang="pt-BR" b="1" dirty="0">
+                <a:solidFill>
+                  <a:srgbClr val="2D3356"/>
+                </a:solidFill>
+                <a:latin typeface="Arial" panose="020B0604020202020204" pitchFamily="34" charset="0"/>
+                <a:ea typeface="Source Sans Pro" panose="020B0503030403020204" pitchFamily="34" charset="0"/>
+                <a:cs typeface="Arial" panose="020B0604020202020204" pitchFamily="34" charset="0"/>
+              </a:rPr>
+              <a:t> Leads (QL)</a:t>
+            </a:r>
+          </a:p>
+        </p:txBody>
+      </p:sp>
+    </p:spTree>
+    <p:extLst>
+      <p:ext uri="{BB962C8B-B14F-4D97-AF65-F5344CB8AC3E}">
+        <p14:creationId xmlns:p14="http://schemas.microsoft.com/office/powerpoint/2010/main" val="1772594908"/>
+      </p:ext>
+    </p:extLst>
+  </p:cSld>
+  <p:clrMapOvr>
+    <a:masterClrMapping/>
+  </p:clrMapOvr>
+</p:sld>
+</file>
+
+<file path=ppt/slides/slide6.xml><?xml version="1.0" encoding="utf-8"?>
+<p:sld xmlns:a="http://schemas.openxmlformats.org/drawingml/2006/main" xmlns:r="http://schemas.openxmlformats.org/officeDocument/2006/relationships" xmlns:p="http://schemas.openxmlformats.org/presentationml/2006/main">
+  <p:cSld>
+    <p:spTree>
+      <p:nvGrpSpPr>
+        <p:cNvPr id="1" name=""/>
+        <p:cNvGrpSpPr/>
+        <p:nvPr/>
+      </p:nvGrpSpPr>
+      <p:grpSpPr>
+        <a:xfrm>
+          <a:off x="0" y="0"/>
+          <a:ext cx="0" cy="0"/>
+          <a:chOff x="0" y="0"/>
+          <a:chExt cx="0" cy="0"/>
+        </a:xfrm>
+      </p:grpSpPr>
+      <p:pic>
+        <p:nvPicPr>
+          <p:cNvPr id="9" name="Imagem 8">
+            <a:extLst>
+              <a:ext uri="{FF2B5EF4-FFF2-40B4-BE49-F238E27FC236}">
+                <a16:creationId xmlns:a16="http://schemas.microsoft.com/office/drawing/2014/main" id="{B2636F1D-1518-9BCD-6356-3D86F93A3CD0}"/>
+              </a:ext>
+            </a:extLst>
+          </p:cNvPr>
+          <p:cNvPicPr>
+            <a:picLocks noChangeAspect="1"/>
+          </p:cNvPicPr>
+          <p:nvPr/>
+        </p:nvPicPr>
+        <p:blipFill rotWithShape="1">
+          <a:blip r:embed="rId2">
+            <a:extLst>
+              <a:ext uri="{28A0092B-C50C-407E-A947-70E740481C1C}">
+                <a14:useLocalDpi xmlns:a14="http://schemas.microsoft.com/office/drawing/2010/main" val="0"/>
+              </a:ext>
+            </a:extLst>
+          </a:blip>
+          <a:srcRect l="31460" t="15835" r="31841" b="15594"/>
+          <a:stretch/>
+        </p:blipFill>
+        <p:spPr>
+          <a:xfrm>
+            <a:off x="11121272" y="5791200"/>
+            <a:ext cx="969130" cy="950686"/>
+          </a:xfrm>
+          <a:prstGeom prst="rect">
+            <a:avLst/>
+          </a:prstGeom>
+        </p:spPr>
+      </p:pic>
+      <p:sp>
+        <p:nvSpPr>
+          <p:cNvPr id="2" name="Retângulo 1">
+            <a:extLst>
+              <a:ext uri="{FF2B5EF4-FFF2-40B4-BE49-F238E27FC236}">
+                <a16:creationId xmlns:a16="http://schemas.microsoft.com/office/drawing/2014/main" id="{ACFCFF69-0145-1DB8-07A7-1430ECA53561}"/>
+              </a:ext>
+            </a:extLst>
+          </p:cNvPr>
+          <p:cNvSpPr/>
+          <p:nvPr/>
+        </p:nvSpPr>
+        <p:spPr>
+          <a:xfrm>
+            <a:off x="101598" y="3947886"/>
+            <a:ext cx="159657" cy="2750457"/>
+          </a:xfrm>
+          <a:prstGeom prst="rect">
+            <a:avLst/>
+          </a:prstGeom>
+          <a:solidFill>
+            <a:srgbClr val="2C3357"/>
+          </a:solidFill>
+          <a:ln>
+            <a:noFill/>
+          </a:ln>
+        </p:spPr>
+        <p:style>
+          <a:lnRef idx="2">
+            <a:schemeClr val="accent1">
+              <a:shade val="15000"/>
+            </a:schemeClr>
+          </a:lnRef>
+          <a:fillRef idx="1">
+            <a:schemeClr val="accent1"/>
+          </a:fillRef>
+          <a:effectRef idx="0">
+            <a:schemeClr val="accent1"/>
+          </a:effectRef>
+          <a:fontRef idx="minor">
+            <a:schemeClr val="lt1"/>
+          </a:fontRef>
+        </p:style>
+        <p:txBody>
+          <a:bodyPr rtlCol="0" anchor="ctr"/>
+          <a:lstStyle/>
+          <a:p>
+            <a:pPr algn="ctr"/>
+            <a:endParaRPr lang="pt-BR"/>
+          </a:p>
+        </p:txBody>
+      </p:sp>
+      <p:sp>
+        <p:nvSpPr>
+          <p:cNvPr id="3" name="Retângulo 2">
+            <a:extLst>
+              <a:ext uri="{FF2B5EF4-FFF2-40B4-BE49-F238E27FC236}">
+                <a16:creationId xmlns:a16="http://schemas.microsoft.com/office/drawing/2014/main" id="{7CAC28F4-82CB-DCD1-BECB-10D07127B697}"/>
+              </a:ext>
+            </a:extLst>
+          </p:cNvPr>
+          <p:cNvSpPr/>
+          <p:nvPr/>
+        </p:nvSpPr>
+        <p:spPr>
+          <a:xfrm>
+            <a:off x="355598" y="6008914"/>
+            <a:ext cx="159657" cy="689429"/>
+          </a:xfrm>
+          <a:prstGeom prst="rect">
+            <a:avLst/>
+          </a:prstGeom>
+          <a:solidFill>
+            <a:srgbClr val="2C3357"/>
+          </a:solidFill>
+          <a:ln>
+            <a:noFill/>
+          </a:ln>
+        </p:spPr>
+        <p:style>
+          <a:lnRef idx="2">
+            <a:schemeClr val="accent1">
+              <a:shade val="15000"/>
+            </a:schemeClr>
+          </a:lnRef>
+          <a:fillRef idx="1">
+            <a:schemeClr val="accent1"/>
+          </a:fillRef>
+          <a:effectRef idx="0">
+            <a:schemeClr val="accent1"/>
+          </a:effectRef>
+          <a:fontRef idx="minor">
+            <a:schemeClr val="lt1"/>
+          </a:fontRef>
+        </p:style>
+        <p:txBody>
+          <a:bodyPr rtlCol="0" anchor="ctr"/>
+          <a:lstStyle/>
+          <a:p>
+            <a:pPr algn="ctr"/>
+            <a:endParaRPr lang="pt-BR"/>
+          </a:p>
+        </p:txBody>
+      </p:sp>
+      <p:sp>
+        <p:nvSpPr>
+          <p:cNvPr id="4" name="Retângulo 3">
+            <a:extLst>
+              <a:ext uri="{FF2B5EF4-FFF2-40B4-BE49-F238E27FC236}">
+                <a16:creationId xmlns:a16="http://schemas.microsoft.com/office/drawing/2014/main" id="{89AD25BB-9EF0-67F9-4D60-8D9F4E15B37A}"/>
+              </a:ext>
+            </a:extLst>
+          </p:cNvPr>
+          <p:cNvSpPr/>
+          <p:nvPr/>
+        </p:nvSpPr>
+        <p:spPr>
+          <a:xfrm>
+            <a:off x="11887200" y="116114"/>
+            <a:ext cx="159657" cy="2750457"/>
+          </a:xfrm>
+          <a:prstGeom prst="rect">
+            <a:avLst/>
+          </a:prstGeom>
+          <a:solidFill>
+            <a:srgbClr val="2C3357"/>
+          </a:solidFill>
+          <a:ln>
+            <a:noFill/>
+          </a:ln>
+        </p:spPr>
+        <p:style>
+          <a:lnRef idx="2">
+            <a:schemeClr val="accent1">
+              <a:shade val="15000"/>
+            </a:schemeClr>
+          </a:lnRef>
+          <a:fillRef idx="1">
+            <a:schemeClr val="accent1"/>
+          </a:fillRef>
+          <a:effectRef idx="0">
+            <a:schemeClr val="accent1"/>
+          </a:effectRef>
+          <a:fontRef idx="minor">
+            <a:schemeClr val="lt1"/>
+          </a:fontRef>
+        </p:style>
+        <p:txBody>
+          <a:bodyPr rtlCol="0" anchor="ctr"/>
+          <a:lstStyle/>
+          <a:p>
+            <a:pPr algn="ctr"/>
+            <a:endParaRPr lang="pt-BR"/>
+          </a:p>
+        </p:txBody>
+      </p:sp>
+      <p:sp>
+        <p:nvSpPr>
+          <p:cNvPr id="5" name="Retângulo 4">
+            <a:extLst>
+              <a:ext uri="{FF2B5EF4-FFF2-40B4-BE49-F238E27FC236}">
+                <a16:creationId xmlns:a16="http://schemas.microsoft.com/office/drawing/2014/main" id="{D7A0BD04-7488-0F80-C86B-76FD8D02D634}"/>
+              </a:ext>
+            </a:extLst>
+          </p:cNvPr>
+          <p:cNvSpPr/>
+          <p:nvPr/>
+        </p:nvSpPr>
+        <p:spPr>
+          <a:xfrm>
+            <a:off x="11605837" y="116114"/>
+            <a:ext cx="159657" cy="689429"/>
+          </a:xfrm>
+          <a:prstGeom prst="rect">
+            <a:avLst/>
+          </a:prstGeom>
+          <a:solidFill>
+            <a:srgbClr val="2C3357"/>
+          </a:solidFill>
+          <a:ln>
+            <a:noFill/>
+          </a:ln>
+        </p:spPr>
+        <p:style>
+          <a:lnRef idx="2">
+            <a:schemeClr val="accent1">
+              <a:shade val="15000"/>
+            </a:schemeClr>
+          </a:lnRef>
+          <a:fillRef idx="1">
+            <a:schemeClr val="accent1"/>
+          </a:fillRef>
+          <a:effectRef idx="0">
+            <a:schemeClr val="accent1"/>
+          </a:effectRef>
+          <a:fontRef idx="minor">
+            <a:schemeClr val="lt1"/>
+          </a:fontRef>
+        </p:style>
+        <p:txBody>
+          <a:bodyPr rtlCol="0" anchor="ctr"/>
+          <a:lstStyle/>
+          <a:p>
+            <a:pPr algn="ctr"/>
+            <a:endParaRPr lang="pt-BR"/>
+          </a:p>
+        </p:txBody>
+      </p:sp>
+      <p:sp>
+        <p:nvSpPr>
+          <p:cNvPr id="8" name="Retângulo: Cantos Arredondados 7">
+            <a:extLst>
+              <a:ext uri="{FF2B5EF4-FFF2-40B4-BE49-F238E27FC236}">
+                <a16:creationId xmlns:a16="http://schemas.microsoft.com/office/drawing/2014/main" id="{FEDA4279-046B-CFEB-8276-204885BC3435}"/>
+              </a:ext>
+            </a:extLst>
+          </p:cNvPr>
+          <p:cNvSpPr/>
+          <p:nvPr/>
+        </p:nvSpPr>
+        <p:spPr>
+          <a:xfrm>
+            <a:off x="515255" y="805543"/>
+            <a:ext cx="5892800" cy="77652"/>
+          </a:xfrm>
+          <a:prstGeom prst="roundRect">
+            <a:avLst/>
+          </a:prstGeom>
+          <a:solidFill>
+            <a:srgbClr val="2C3357"/>
+          </a:solidFill>
+          <a:ln>
+            <a:noFill/>
+          </a:ln>
+        </p:spPr>
+        <p:style>
+          <a:lnRef idx="2">
+            <a:schemeClr val="accent1">
+              <a:shade val="15000"/>
+            </a:schemeClr>
+          </a:lnRef>
+          <a:fillRef idx="1">
+            <a:schemeClr val="accent1"/>
+          </a:fillRef>
+          <a:effectRef idx="0">
+            <a:schemeClr val="accent1"/>
+          </a:effectRef>
+          <a:fontRef idx="minor">
+            <a:schemeClr val="lt1"/>
+          </a:fontRef>
+        </p:style>
+        <p:txBody>
+          <a:bodyPr rtlCol="0" anchor="ctr"/>
+          <a:lstStyle/>
+          <a:p>
+            <a:pPr algn="ctr"/>
+            <a:endParaRPr lang="pt-BR"/>
+          </a:p>
+        </p:txBody>
+      </p:sp>
+      <p:sp>
+        <p:nvSpPr>
+          <p:cNvPr id="10" name="CaixaDeTexto 9">
+            <a:extLst>
+              <a:ext uri="{FF2B5EF4-FFF2-40B4-BE49-F238E27FC236}">
+                <a16:creationId xmlns:a16="http://schemas.microsoft.com/office/drawing/2014/main" id="{396D93A1-9263-21FF-88CA-2993CAC8492B}"/>
+              </a:ext>
+            </a:extLst>
+          </p:cNvPr>
+          <p:cNvSpPr txBox="1"/>
+          <p:nvPr/>
+        </p:nvSpPr>
+        <p:spPr>
+          <a:xfrm>
+            <a:off x="515255" y="436211"/>
+            <a:ext cx="6096000" cy="369332"/>
+          </a:xfrm>
+          <a:prstGeom prst="rect">
+            <a:avLst/>
+          </a:prstGeom>
+          <a:noFill/>
+        </p:spPr>
+        <p:txBody>
+          <a:bodyPr wrap="square" rtlCol="0">
+            <a:spAutoFit/>
+          </a:bodyPr>
+          <a:lstStyle/>
+          <a:p>
+            <a:r>
+              <a:rPr lang="pt-BR" b="1" dirty="0">
+                <a:solidFill>
+                  <a:srgbClr val="2D3356"/>
+                </a:solidFill>
+                <a:latin typeface="Arial" panose="020B0604020202020204" pitchFamily="34" charset="0"/>
+                <a:ea typeface="Source Sans Pro" panose="020B0503030403020204" pitchFamily="34" charset="0"/>
+                <a:cs typeface="Arial" panose="020B0604020202020204" pitchFamily="34" charset="0"/>
+              </a:rPr>
+              <a:t>Previsão de </a:t>
+            </a:r>
+            <a:r>
+              <a:rPr lang="pt-BR" b="1" dirty="0" err="1">
+                <a:solidFill>
+                  <a:srgbClr val="2D3356"/>
+                </a:solidFill>
+                <a:latin typeface="Arial" panose="020B0604020202020204" pitchFamily="34" charset="0"/>
+                <a:ea typeface="Source Sans Pro" panose="020B0503030403020204" pitchFamily="34" charset="0"/>
+                <a:cs typeface="Arial" panose="020B0604020202020204" pitchFamily="34" charset="0"/>
+              </a:rPr>
+              <a:t>Quality</a:t>
+            </a:r>
+            <a:r>
+              <a:rPr lang="pt-BR" b="1" dirty="0">
+                <a:solidFill>
+                  <a:srgbClr val="2D3356"/>
+                </a:solidFill>
+                <a:latin typeface="Arial" panose="020B0604020202020204" pitchFamily="34" charset="0"/>
+                <a:ea typeface="Source Sans Pro" panose="020B0503030403020204" pitchFamily="34" charset="0"/>
+                <a:cs typeface="Arial" panose="020B0604020202020204" pitchFamily="34" charset="0"/>
+              </a:rPr>
+              <a:t> Leads (QL)</a:t>
+            </a:r>
+          </a:p>
+        </p:txBody>
+      </p:sp>
+    </p:spTree>
+    <p:extLst>
+      <p:ext uri="{BB962C8B-B14F-4D97-AF65-F5344CB8AC3E}">
+        <p14:creationId xmlns:p14="http://schemas.microsoft.com/office/powerpoint/2010/main" val="937926876"/>
+      </p:ext>
+    </p:extLst>
+  </p:cSld>
+  <p:clrMapOvr>
+    <a:masterClrMapping/>
+  </p:clrMapOvr>
+</p:sld>
+</file>
+
+<file path=ppt/slides/slide7.xml><?xml version="1.0" encoding="utf-8"?>
+<p:sld xmlns:a="http://schemas.openxmlformats.org/drawingml/2006/main" xmlns:r="http://schemas.openxmlformats.org/officeDocument/2006/relationships" xmlns:p="http://schemas.openxmlformats.org/presentationml/2006/main">
+  <p:cSld>
+    <p:spTree>
+      <p:nvGrpSpPr>
+        <p:cNvPr id="1" name=""/>
+        <p:cNvGrpSpPr/>
+        <p:nvPr/>
+      </p:nvGrpSpPr>
+      <p:grpSpPr>
+        <a:xfrm>
+          <a:off x="0" y="0"/>
+          <a:ext cx="0" cy="0"/>
+          <a:chOff x="0" y="0"/>
+          <a:chExt cx="0" cy="0"/>
+        </a:xfrm>
+      </p:grpSpPr>
+      <p:pic>
+        <p:nvPicPr>
+          <p:cNvPr id="9" name="Imagem 8">
+            <a:extLst>
+              <a:ext uri="{FF2B5EF4-FFF2-40B4-BE49-F238E27FC236}">
+                <a16:creationId xmlns:a16="http://schemas.microsoft.com/office/drawing/2014/main" id="{B2636F1D-1518-9BCD-6356-3D86F93A3CD0}"/>
+              </a:ext>
+            </a:extLst>
+          </p:cNvPr>
+          <p:cNvPicPr>
+            <a:picLocks noChangeAspect="1"/>
+          </p:cNvPicPr>
+          <p:nvPr/>
+        </p:nvPicPr>
+        <p:blipFill rotWithShape="1">
+          <a:blip r:embed="rId2">
+            <a:extLst>
+              <a:ext uri="{28A0092B-C50C-407E-A947-70E740481C1C}">
+                <a14:useLocalDpi xmlns:a14="http://schemas.microsoft.com/office/drawing/2010/main" val="0"/>
+              </a:ext>
+            </a:extLst>
+          </a:blip>
+          <a:srcRect l="31460" t="15835" r="31841" b="15594"/>
+          <a:stretch/>
+        </p:blipFill>
+        <p:spPr>
+          <a:xfrm>
+            <a:off x="11121272" y="5791200"/>
+            <a:ext cx="969130" cy="950686"/>
+          </a:xfrm>
+          <a:prstGeom prst="rect">
+            <a:avLst/>
+          </a:prstGeom>
+        </p:spPr>
+      </p:pic>
+      <p:sp>
+        <p:nvSpPr>
+          <p:cNvPr id="2" name="Retângulo 1">
+            <a:extLst>
+              <a:ext uri="{FF2B5EF4-FFF2-40B4-BE49-F238E27FC236}">
+                <a16:creationId xmlns:a16="http://schemas.microsoft.com/office/drawing/2014/main" id="{ACFCFF69-0145-1DB8-07A7-1430ECA53561}"/>
+              </a:ext>
+            </a:extLst>
+          </p:cNvPr>
+          <p:cNvSpPr/>
+          <p:nvPr/>
+        </p:nvSpPr>
+        <p:spPr>
+          <a:xfrm>
+            <a:off x="101598" y="3947886"/>
+            <a:ext cx="159657" cy="2750457"/>
+          </a:xfrm>
+          <a:prstGeom prst="rect">
+            <a:avLst/>
+          </a:prstGeom>
+          <a:solidFill>
+            <a:srgbClr val="2C3357"/>
+          </a:solidFill>
+          <a:ln>
+            <a:noFill/>
+          </a:ln>
+        </p:spPr>
+        <p:style>
+          <a:lnRef idx="2">
+            <a:schemeClr val="accent1">
+              <a:shade val="15000"/>
+            </a:schemeClr>
+          </a:lnRef>
+          <a:fillRef idx="1">
+            <a:schemeClr val="accent1"/>
+          </a:fillRef>
+          <a:effectRef idx="0">
+            <a:schemeClr val="accent1"/>
+          </a:effectRef>
+          <a:fontRef idx="minor">
+            <a:schemeClr val="lt1"/>
+          </a:fontRef>
+        </p:style>
+        <p:txBody>
+          <a:bodyPr rtlCol="0" anchor="ctr"/>
+          <a:lstStyle/>
+          <a:p>
+            <a:pPr algn="ctr"/>
+            <a:endParaRPr lang="pt-BR"/>
+          </a:p>
+        </p:txBody>
+      </p:sp>
+      <p:sp>
+        <p:nvSpPr>
+          <p:cNvPr id="3" name="Retângulo 2">
+            <a:extLst>
+              <a:ext uri="{FF2B5EF4-FFF2-40B4-BE49-F238E27FC236}">
+                <a16:creationId xmlns:a16="http://schemas.microsoft.com/office/drawing/2014/main" id="{7CAC28F4-82CB-DCD1-BECB-10D07127B697}"/>
+              </a:ext>
+            </a:extLst>
+          </p:cNvPr>
+          <p:cNvSpPr/>
+          <p:nvPr/>
+        </p:nvSpPr>
+        <p:spPr>
+          <a:xfrm>
+            <a:off x="355598" y="6008914"/>
+            <a:ext cx="159657" cy="689429"/>
+          </a:xfrm>
+          <a:prstGeom prst="rect">
+            <a:avLst/>
+          </a:prstGeom>
+          <a:solidFill>
+            <a:srgbClr val="2C3357"/>
+          </a:solidFill>
+          <a:ln>
+            <a:noFill/>
+          </a:ln>
+        </p:spPr>
+        <p:style>
+          <a:lnRef idx="2">
+            <a:schemeClr val="accent1">
+              <a:shade val="15000"/>
+            </a:schemeClr>
+          </a:lnRef>
+          <a:fillRef idx="1">
+            <a:schemeClr val="accent1"/>
+          </a:fillRef>
+          <a:effectRef idx="0">
+            <a:schemeClr val="accent1"/>
+          </a:effectRef>
+          <a:fontRef idx="minor">
+            <a:schemeClr val="lt1"/>
+          </a:fontRef>
+        </p:style>
+        <p:txBody>
+          <a:bodyPr rtlCol="0" anchor="ctr"/>
+          <a:lstStyle/>
+          <a:p>
+            <a:pPr algn="ctr"/>
+            <a:endParaRPr lang="pt-BR"/>
+          </a:p>
+        </p:txBody>
+      </p:sp>
+      <p:sp>
+        <p:nvSpPr>
+          <p:cNvPr id="4" name="Retângulo 3">
+            <a:extLst>
+              <a:ext uri="{FF2B5EF4-FFF2-40B4-BE49-F238E27FC236}">
+                <a16:creationId xmlns:a16="http://schemas.microsoft.com/office/drawing/2014/main" id="{89AD25BB-9EF0-67F9-4D60-8D9F4E15B37A}"/>
+              </a:ext>
+            </a:extLst>
+          </p:cNvPr>
+          <p:cNvSpPr/>
+          <p:nvPr/>
+        </p:nvSpPr>
+        <p:spPr>
+          <a:xfrm>
+            <a:off x="11887200" y="116114"/>
+            <a:ext cx="159657" cy="2750457"/>
+          </a:xfrm>
+          <a:prstGeom prst="rect">
+            <a:avLst/>
+          </a:prstGeom>
+          <a:solidFill>
+            <a:srgbClr val="2C3357"/>
+          </a:solidFill>
+          <a:ln>
+            <a:noFill/>
+          </a:ln>
+        </p:spPr>
+        <p:style>
+          <a:lnRef idx="2">
+            <a:schemeClr val="accent1">
+              <a:shade val="15000"/>
+            </a:schemeClr>
+          </a:lnRef>
+          <a:fillRef idx="1">
+            <a:schemeClr val="accent1"/>
+          </a:fillRef>
+          <a:effectRef idx="0">
+            <a:schemeClr val="accent1"/>
+          </a:effectRef>
+          <a:fontRef idx="minor">
+            <a:schemeClr val="lt1"/>
+          </a:fontRef>
+        </p:style>
+        <p:txBody>
+          <a:bodyPr rtlCol="0" anchor="ctr"/>
+          <a:lstStyle/>
+          <a:p>
+            <a:pPr algn="ctr"/>
+            <a:endParaRPr lang="pt-BR"/>
+          </a:p>
+        </p:txBody>
+      </p:sp>
+      <p:sp>
+        <p:nvSpPr>
+          <p:cNvPr id="5" name="Retângulo 4">
+            <a:extLst>
+              <a:ext uri="{FF2B5EF4-FFF2-40B4-BE49-F238E27FC236}">
+                <a16:creationId xmlns:a16="http://schemas.microsoft.com/office/drawing/2014/main" id="{D7A0BD04-7488-0F80-C86B-76FD8D02D634}"/>
+              </a:ext>
+            </a:extLst>
+          </p:cNvPr>
+          <p:cNvSpPr/>
+          <p:nvPr/>
+        </p:nvSpPr>
+        <p:spPr>
+          <a:xfrm>
+            <a:off x="11605837" y="116114"/>
+            <a:ext cx="159657" cy="689429"/>
+          </a:xfrm>
+          <a:prstGeom prst="rect">
+            <a:avLst/>
+          </a:prstGeom>
+          <a:solidFill>
+            <a:srgbClr val="2C3357"/>
+          </a:solidFill>
+          <a:ln>
+            <a:noFill/>
+          </a:ln>
+        </p:spPr>
+        <p:style>
+          <a:lnRef idx="2">
+            <a:schemeClr val="accent1">
+              <a:shade val="15000"/>
+            </a:schemeClr>
+          </a:lnRef>
+          <a:fillRef idx="1">
+            <a:schemeClr val="accent1"/>
+          </a:fillRef>
+          <a:effectRef idx="0">
+            <a:schemeClr val="accent1"/>
+          </a:effectRef>
+          <a:fontRef idx="minor">
+            <a:schemeClr val="lt1"/>
+          </a:fontRef>
+        </p:style>
+        <p:txBody>
+          <a:bodyPr rtlCol="0" anchor="ctr"/>
+          <a:lstStyle/>
+          <a:p>
+            <a:pPr algn="ctr"/>
+            <a:endParaRPr lang="pt-BR"/>
+          </a:p>
+        </p:txBody>
+      </p:sp>
+      <p:sp>
+        <p:nvSpPr>
+          <p:cNvPr id="8" name="Retângulo: Cantos Arredondados 7">
+            <a:extLst>
+              <a:ext uri="{FF2B5EF4-FFF2-40B4-BE49-F238E27FC236}">
+                <a16:creationId xmlns:a16="http://schemas.microsoft.com/office/drawing/2014/main" id="{FEDA4279-046B-CFEB-8276-204885BC3435}"/>
+              </a:ext>
+            </a:extLst>
+          </p:cNvPr>
+          <p:cNvSpPr/>
+          <p:nvPr/>
+        </p:nvSpPr>
+        <p:spPr>
+          <a:xfrm>
+            <a:off x="515255" y="805543"/>
+            <a:ext cx="5892800" cy="77652"/>
+          </a:xfrm>
+          <a:prstGeom prst="roundRect">
+            <a:avLst/>
+          </a:prstGeom>
+          <a:solidFill>
+            <a:srgbClr val="2C3357"/>
+          </a:solidFill>
+          <a:ln>
+            <a:noFill/>
+          </a:ln>
+        </p:spPr>
+        <p:style>
+          <a:lnRef idx="2">
+            <a:schemeClr val="accent1">
+              <a:shade val="15000"/>
+            </a:schemeClr>
+          </a:lnRef>
+          <a:fillRef idx="1">
+            <a:schemeClr val="accent1"/>
+          </a:fillRef>
+          <a:effectRef idx="0">
+            <a:schemeClr val="accent1"/>
+          </a:effectRef>
+          <a:fontRef idx="minor">
+            <a:schemeClr val="lt1"/>
+          </a:fontRef>
+        </p:style>
+        <p:txBody>
+          <a:bodyPr rtlCol="0" anchor="ctr"/>
+          <a:lstStyle/>
+          <a:p>
+            <a:pPr algn="ctr"/>
+            <a:endParaRPr lang="pt-BR"/>
+          </a:p>
+        </p:txBody>
+      </p:sp>
+      <p:sp>
+        <p:nvSpPr>
+          <p:cNvPr id="10" name="CaixaDeTexto 9">
+            <a:extLst>
+              <a:ext uri="{FF2B5EF4-FFF2-40B4-BE49-F238E27FC236}">
+                <a16:creationId xmlns:a16="http://schemas.microsoft.com/office/drawing/2014/main" id="{396D93A1-9263-21FF-88CA-2993CAC8492B}"/>
+              </a:ext>
+            </a:extLst>
+          </p:cNvPr>
+          <p:cNvSpPr txBox="1"/>
+          <p:nvPr/>
+        </p:nvSpPr>
+        <p:spPr>
+          <a:xfrm>
+            <a:off x="515255" y="436211"/>
+            <a:ext cx="6096000" cy="369332"/>
+          </a:xfrm>
+          <a:prstGeom prst="rect">
+            <a:avLst/>
+          </a:prstGeom>
+          <a:noFill/>
+        </p:spPr>
+        <p:txBody>
+          <a:bodyPr wrap="square" rtlCol="0">
+            <a:spAutoFit/>
+          </a:bodyPr>
+          <a:lstStyle/>
+          <a:p>
+            <a:r>
+              <a:rPr lang="pt-BR" b="1" dirty="0">
+                <a:solidFill>
+                  <a:srgbClr val="2D3356"/>
+                </a:solidFill>
+                <a:latin typeface="Arial" panose="020B0604020202020204" pitchFamily="34" charset="0"/>
+                <a:ea typeface="Source Sans Pro" panose="020B0503030403020204" pitchFamily="34" charset="0"/>
+                <a:cs typeface="Arial" panose="020B0604020202020204" pitchFamily="34" charset="0"/>
+              </a:rPr>
+              <a:t>Previsão de </a:t>
+            </a:r>
+            <a:r>
+              <a:rPr lang="pt-BR" b="1" dirty="0" err="1">
+                <a:solidFill>
+                  <a:srgbClr val="2D3356"/>
+                </a:solidFill>
+                <a:latin typeface="Arial" panose="020B0604020202020204" pitchFamily="34" charset="0"/>
+                <a:ea typeface="Source Sans Pro" panose="020B0503030403020204" pitchFamily="34" charset="0"/>
+                <a:cs typeface="Arial" panose="020B0604020202020204" pitchFamily="34" charset="0"/>
+              </a:rPr>
+              <a:t>Quality</a:t>
+            </a:r>
+            <a:r>
+              <a:rPr lang="pt-BR" b="1" dirty="0">
+                <a:solidFill>
+                  <a:srgbClr val="2D3356"/>
+                </a:solidFill>
+                <a:latin typeface="Arial" panose="020B0604020202020204" pitchFamily="34" charset="0"/>
+                <a:ea typeface="Source Sans Pro" panose="020B0503030403020204" pitchFamily="34" charset="0"/>
+                <a:cs typeface="Arial" panose="020B0604020202020204" pitchFamily="34" charset="0"/>
+              </a:rPr>
+              <a:t> Leads (QL)</a:t>
+            </a:r>
+          </a:p>
+        </p:txBody>
+      </p:sp>
+    </p:spTree>
+    <p:extLst>
+      <p:ext uri="{BB962C8B-B14F-4D97-AF65-F5344CB8AC3E}">
+        <p14:creationId xmlns:p14="http://schemas.microsoft.com/office/powerpoint/2010/main" val="2567184458"/>
+      </p:ext>
+    </p:extLst>
+  </p:cSld>
+  <p:clrMapOvr>
+    <a:masterClrMapping/>
+  </p:clrMapOvr>
+</p:sld>
+</file>
+
+<file path=ppt/slides/slide8.xml><?xml version="1.0" encoding="utf-8"?>
+<p:sld xmlns:a="http://schemas.openxmlformats.org/drawingml/2006/main" xmlns:r="http://schemas.openxmlformats.org/officeDocument/2006/relationships" xmlns:p="http://schemas.openxmlformats.org/presentationml/2006/main">
+  <p:cSld>
+    <p:spTree>
+      <p:nvGrpSpPr>
+        <p:cNvPr id="1" name=""/>
+        <p:cNvGrpSpPr/>
+        <p:nvPr/>
+      </p:nvGrpSpPr>
+      <p:grpSpPr>
+        <a:xfrm>
+          <a:off x="0" y="0"/>
+          <a:ext cx="0" cy="0"/>
+          <a:chOff x="0" y="0"/>
+          <a:chExt cx="0" cy="0"/>
+        </a:xfrm>
+      </p:grpSpPr>
+      <p:pic>
+        <p:nvPicPr>
+          <p:cNvPr id="9" name="Imagem 8">
+            <a:extLst>
+              <a:ext uri="{FF2B5EF4-FFF2-40B4-BE49-F238E27FC236}">
+                <a16:creationId xmlns:a16="http://schemas.microsoft.com/office/drawing/2014/main" id="{B2636F1D-1518-9BCD-6356-3D86F93A3CD0}"/>
+              </a:ext>
+            </a:extLst>
+          </p:cNvPr>
+          <p:cNvPicPr>
+            <a:picLocks noChangeAspect="1"/>
+          </p:cNvPicPr>
+          <p:nvPr/>
+        </p:nvPicPr>
+        <p:blipFill rotWithShape="1">
+          <a:blip r:embed="rId2">
+            <a:extLst>
+              <a:ext uri="{28A0092B-C50C-407E-A947-70E740481C1C}">
+                <a14:useLocalDpi xmlns:a14="http://schemas.microsoft.com/office/drawing/2010/main" val="0"/>
+              </a:ext>
+            </a:extLst>
+          </a:blip>
+          <a:srcRect l="31460" t="15835" r="31841" b="15594"/>
+          <a:stretch/>
+        </p:blipFill>
+        <p:spPr>
+          <a:xfrm>
+            <a:off x="11121272" y="5791200"/>
+            <a:ext cx="969130" cy="950686"/>
+          </a:xfrm>
+          <a:prstGeom prst="rect">
+            <a:avLst/>
+          </a:prstGeom>
+        </p:spPr>
+      </p:pic>
+      <p:sp>
+        <p:nvSpPr>
+          <p:cNvPr id="2" name="Retângulo 1">
+            <a:extLst>
+              <a:ext uri="{FF2B5EF4-FFF2-40B4-BE49-F238E27FC236}">
+                <a16:creationId xmlns:a16="http://schemas.microsoft.com/office/drawing/2014/main" id="{ACFCFF69-0145-1DB8-07A7-1430ECA53561}"/>
+              </a:ext>
+            </a:extLst>
+          </p:cNvPr>
+          <p:cNvSpPr/>
+          <p:nvPr/>
+        </p:nvSpPr>
+        <p:spPr>
+          <a:xfrm>
+            <a:off x="101598" y="3947886"/>
+            <a:ext cx="159657" cy="2750457"/>
+          </a:xfrm>
+          <a:prstGeom prst="rect">
+            <a:avLst/>
+          </a:prstGeom>
+          <a:solidFill>
+            <a:srgbClr val="2C3357"/>
+          </a:solidFill>
+          <a:ln>
+            <a:noFill/>
+          </a:ln>
+        </p:spPr>
+        <p:style>
+          <a:lnRef idx="2">
+            <a:schemeClr val="accent1">
+              <a:shade val="15000"/>
+            </a:schemeClr>
+          </a:lnRef>
+          <a:fillRef idx="1">
+            <a:schemeClr val="accent1"/>
+          </a:fillRef>
+          <a:effectRef idx="0">
+            <a:schemeClr val="accent1"/>
+          </a:effectRef>
+          <a:fontRef idx="minor">
+            <a:schemeClr val="lt1"/>
+          </a:fontRef>
+        </p:style>
+        <p:txBody>
+          <a:bodyPr rtlCol="0" anchor="ctr"/>
+          <a:lstStyle/>
+          <a:p>
+            <a:pPr algn="ctr"/>
+            <a:endParaRPr lang="pt-BR"/>
+          </a:p>
+        </p:txBody>
+      </p:sp>
+      <p:sp>
+        <p:nvSpPr>
+          <p:cNvPr id="3" name="Retângulo 2">
+            <a:extLst>
+              <a:ext uri="{FF2B5EF4-FFF2-40B4-BE49-F238E27FC236}">
+                <a16:creationId xmlns:a16="http://schemas.microsoft.com/office/drawing/2014/main" id="{7CAC28F4-82CB-DCD1-BECB-10D07127B697}"/>
+              </a:ext>
+            </a:extLst>
+          </p:cNvPr>
+          <p:cNvSpPr/>
+          <p:nvPr/>
+        </p:nvSpPr>
+        <p:spPr>
+          <a:xfrm>
+            <a:off x="355598" y="6008914"/>
+            <a:ext cx="159657" cy="689429"/>
+          </a:xfrm>
+          <a:prstGeom prst="rect">
+            <a:avLst/>
+          </a:prstGeom>
+          <a:solidFill>
+            <a:srgbClr val="2C3357"/>
+          </a:solidFill>
+          <a:ln>
+            <a:noFill/>
+          </a:ln>
+        </p:spPr>
+        <p:style>
+          <a:lnRef idx="2">
+            <a:schemeClr val="accent1">
+              <a:shade val="15000"/>
+            </a:schemeClr>
+          </a:lnRef>
+          <a:fillRef idx="1">
+            <a:schemeClr val="accent1"/>
+          </a:fillRef>
+          <a:effectRef idx="0">
+            <a:schemeClr val="accent1"/>
+          </a:effectRef>
+          <a:fontRef idx="minor">
+            <a:schemeClr val="lt1"/>
+          </a:fontRef>
+        </p:style>
+        <p:txBody>
+          <a:bodyPr rtlCol="0" anchor="ctr"/>
+          <a:lstStyle/>
+          <a:p>
+            <a:pPr algn="ctr"/>
+            <a:endParaRPr lang="pt-BR"/>
+          </a:p>
+        </p:txBody>
+      </p:sp>
+      <p:sp>
+        <p:nvSpPr>
+          <p:cNvPr id="4" name="Retângulo 3">
+            <a:extLst>
+              <a:ext uri="{FF2B5EF4-FFF2-40B4-BE49-F238E27FC236}">
+                <a16:creationId xmlns:a16="http://schemas.microsoft.com/office/drawing/2014/main" id="{89AD25BB-9EF0-67F9-4D60-8D9F4E15B37A}"/>
+              </a:ext>
+            </a:extLst>
+          </p:cNvPr>
+          <p:cNvSpPr/>
+          <p:nvPr/>
+        </p:nvSpPr>
+        <p:spPr>
+          <a:xfrm>
+            <a:off x="11887200" y="116114"/>
+            <a:ext cx="159657" cy="2750457"/>
+          </a:xfrm>
+          <a:prstGeom prst="rect">
+            <a:avLst/>
+          </a:prstGeom>
+          <a:solidFill>
+            <a:srgbClr val="2C3357"/>
+          </a:solidFill>
+          <a:ln>
+            <a:noFill/>
+          </a:ln>
+        </p:spPr>
+        <p:style>
+          <a:lnRef idx="2">
+            <a:schemeClr val="accent1">
+              <a:shade val="15000"/>
+            </a:schemeClr>
+          </a:lnRef>
+          <a:fillRef idx="1">
+            <a:schemeClr val="accent1"/>
+          </a:fillRef>
+          <a:effectRef idx="0">
+            <a:schemeClr val="accent1"/>
+          </a:effectRef>
+          <a:fontRef idx="minor">
+            <a:schemeClr val="lt1"/>
+          </a:fontRef>
+        </p:style>
+        <p:txBody>
+          <a:bodyPr rtlCol="0" anchor="ctr"/>
+          <a:lstStyle/>
+          <a:p>
+            <a:pPr algn="ctr"/>
+            <a:endParaRPr lang="pt-BR"/>
+          </a:p>
+        </p:txBody>
+      </p:sp>
+      <p:sp>
+        <p:nvSpPr>
+          <p:cNvPr id="5" name="Retângulo 4">
+            <a:extLst>
+              <a:ext uri="{FF2B5EF4-FFF2-40B4-BE49-F238E27FC236}">
+                <a16:creationId xmlns:a16="http://schemas.microsoft.com/office/drawing/2014/main" id="{D7A0BD04-7488-0F80-C86B-76FD8D02D634}"/>
+              </a:ext>
+            </a:extLst>
+          </p:cNvPr>
+          <p:cNvSpPr/>
+          <p:nvPr/>
+        </p:nvSpPr>
+        <p:spPr>
+          <a:xfrm>
+            <a:off x="11605837" y="116114"/>
+            <a:ext cx="159657" cy="689429"/>
+          </a:xfrm>
+          <a:prstGeom prst="rect">
+            <a:avLst/>
+          </a:prstGeom>
+          <a:solidFill>
+            <a:srgbClr val="2C3357"/>
+          </a:solidFill>
+          <a:ln>
+            <a:noFill/>
+          </a:ln>
+        </p:spPr>
+        <p:style>
+          <a:lnRef idx="2">
+            <a:schemeClr val="accent1">
+              <a:shade val="15000"/>
+            </a:schemeClr>
+          </a:lnRef>
+          <a:fillRef idx="1">
+            <a:schemeClr val="accent1"/>
+          </a:fillRef>
+          <a:effectRef idx="0">
+            <a:schemeClr val="accent1"/>
+          </a:effectRef>
+          <a:fontRef idx="minor">
+            <a:schemeClr val="lt1"/>
+          </a:fontRef>
+        </p:style>
+        <p:txBody>
+          <a:bodyPr rtlCol="0" anchor="ctr"/>
+          <a:lstStyle/>
+          <a:p>
+            <a:pPr algn="ctr"/>
+            <a:endParaRPr lang="pt-BR"/>
+          </a:p>
+        </p:txBody>
+      </p:sp>
+      <p:sp>
+        <p:nvSpPr>
+          <p:cNvPr id="8" name="Retângulo: Cantos Arredondados 7">
+            <a:extLst>
+              <a:ext uri="{FF2B5EF4-FFF2-40B4-BE49-F238E27FC236}">
+                <a16:creationId xmlns:a16="http://schemas.microsoft.com/office/drawing/2014/main" id="{FEDA4279-046B-CFEB-8276-204885BC3435}"/>
+              </a:ext>
+            </a:extLst>
+          </p:cNvPr>
+          <p:cNvSpPr/>
+          <p:nvPr/>
+        </p:nvSpPr>
+        <p:spPr>
+          <a:xfrm>
+            <a:off x="515255" y="805543"/>
+            <a:ext cx="5892800" cy="77652"/>
+          </a:xfrm>
+          <a:prstGeom prst="roundRect">
+            <a:avLst/>
+          </a:prstGeom>
+          <a:solidFill>
+            <a:srgbClr val="2C3357"/>
+          </a:solidFill>
+          <a:ln>
+            <a:noFill/>
+          </a:ln>
+        </p:spPr>
+        <p:style>
+          <a:lnRef idx="2">
+            <a:schemeClr val="accent1">
+              <a:shade val="15000"/>
+            </a:schemeClr>
+          </a:lnRef>
+          <a:fillRef idx="1">
+            <a:schemeClr val="accent1"/>
+          </a:fillRef>
+          <a:effectRef idx="0">
+            <a:schemeClr val="accent1"/>
+          </a:effectRef>
+          <a:fontRef idx="minor">
+            <a:schemeClr val="lt1"/>
+          </a:fontRef>
+        </p:style>
+        <p:txBody>
+          <a:bodyPr rtlCol="0" anchor="ctr"/>
+          <a:lstStyle/>
+          <a:p>
+            <a:pPr algn="ctr"/>
+            <a:endParaRPr lang="pt-BR"/>
+          </a:p>
+        </p:txBody>
+      </p:sp>
+      <p:sp>
+        <p:nvSpPr>
+          <p:cNvPr id="10" name="CaixaDeTexto 9">
+            <a:extLst>
+              <a:ext uri="{FF2B5EF4-FFF2-40B4-BE49-F238E27FC236}">
+                <a16:creationId xmlns:a16="http://schemas.microsoft.com/office/drawing/2014/main" id="{396D93A1-9263-21FF-88CA-2993CAC8492B}"/>
+              </a:ext>
+            </a:extLst>
+          </p:cNvPr>
+          <p:cNvSpPr txBox="1"/>
+          <p:nvPr/>
+        </p:nvSpPr>
+        <p:spPr>
+          <a:xfrm>
+            <a:off x="515255" y="436211"/>
+            <a:ext cx="6096000" cy="369332"/>
+          </a:xfrm>
+          <a:prstGeom prst="rect">
+            <a:avLst/>
+          </a:prstGeom>
+          <a:noFill/>
+        </p:spPr>
+        <p:txBody>
+          <a:bodyPr wrap="square" rtlCol="0">
+            <a:spAutoFit/>
+          </a:bodyPr>
+          <a:lstStyle/>
+          <a:p>
+            <a:r>
+              <a:rPr lang="pt-BR" b="1" dirty="0">
+                <a:solidFill>
+                  <a:srgbClr val="2D3356"/>
+                </a:solidFill>
+                <a:latin typeface="Arial" panose="020B0604020202020204" pitchFamily="34" charset="0"/>
+                <a:ea typeface="Source Sans Pro" panose="020B0503030403020204" pitchFamily="34" charset="0"/>
+                <a:cs typeface="Arial" panose="020B0604020202020204" pitchFamily="34" charset="0"/>
+              </a:rPr>
+              <a:t>Previsão de </a:t>
+            </a:r>
+            <a:r>
+              <a:rPr lang="pt-BR" b="1" dirty="0" err="1">
+                <a:solidFill>
+                  <a:srgbClr val="2D3356"/>
+                </a:solidFill>
+                <a:latin typeface="Arial" panose="020B0604020202020204" pitchFamily="34" charset="0"/>
+                <a:ea typeface="Source Sans Pro" panose="020B0503030403020204" pitchFamily="34" charset="0"/>
+                <a:cs typeface="Arial" panose="020B0604020202020204" pitchFamily="34" charset="0"/>
+              </a:rPr>
+              <a:t>Quality</a:t>
+            </a:r>
+            <a:r>
+              <a:rPr lang="pt-BR" b="1" dirty="0">
+                <a:solidFill>
+                  <a:srgbClr val="2D3356"/>
+                </a:solidFill>
+                <a:latin typeface="Arial" panose="020B0604020202020204" pitchFamily="34" charset="0"/>
+                <a:ea typeface="Source Sans Pro" panose="020B0503030403020204" pitchFamily="34" charset="0"/>
+                <a:cs typeface="Arial" panose="020B0604020202020204" pitchFamily="34" charset="0"/>
+              </a:rPr>
+              <a:t> Leads (QL)</a:t>
+            </a:r>
+          </a:p>
+        </p:txBody>
+      </p:sp>
+    </p:spTree>
+    <p:extLst>
+      <p:ext uri="{BB962C8B-B14F-4D97-AF65-F5344CB8AC3E}">
+        <p14:creationId xmlns:p14="http://schemas.microsoft.com/office/powerpoint/2010/main" val="2176920301"/>
+      </p:ext>
+    </p:extLst>
+  </p:cSld>
+  <p:clrMapOvr>
+    <a:masterClrMapping/>
+  </p:clrMapOvr>
+</p:sld>
+</file>
+
+<file path=ppt/slides/slide9.xml><?xml version="1.0" encoding="utf-8"?>
 <p:sld xmlns:a="http://schemas.openxmlformats.org/drawingml/2006/main" xmlns:r="http://schemas.openxmlformats.org/officeDocument/2006/relationships" xmlns:p="http://schemas.openxmlformats.org/presentationml/2006/main">
   <p:cSld>
     <p:spTree>

</xml_diff>